<commit_message>
fix errors in Android 10: whatapp
</commit_message>
<xml_diff>
--- a/Andriod10/1_Pixel3_Image.pptx
+++ b/Andriod10/1_Pixel3_Image.pptx
@@ -9336,7 +9336,7 @@
           <a:p>
             <a:fld id="{EE41F6E3-57F9-402E-BDBA-5B2DE11C8530}" type="datetimeFigureOut">
               <a:rPr lang="en-US" smtClean="0"/>
-              <a:t>10/24/2021</a:t>
+              <a:t>6/3/2021</a:t>
             </a:fld>
             <a:endParaRPr lang="en-US"/>
           </a:p>
@@ -9648,14 +9648,8 @@
           <a:lstStyle/>
           <a:p>
             <a:r>
-              <a:rPr lang="en-US" dirty="0"/>
+              <a:rPr lang="en-US"/>
               <a:t>https://twrp.me/site/update/2019/10/23/twrp-and-android-10.html</a:t>
-            </a:r>
-          </a:p>
-          <a:p>
-            <a:r>
-              <a:rPr lang="en-US"/>
-              <a:t>https://digitalcorpora.org/corpora/cell-phones/android-10</a:t>
             </a:r>
           </a:p>
         </p:txBody>
@@ -12409,7 +12403,7 @@
           <a:p>
             <a:fld id="{4263717A-E3C1-4BED-ABE0-B7069385E023}" type="datetimeFigureOut">
               <a:rPr lang="en-US" smtClean="0"/>
-              <a:t>10/24/2021</a:t>
+              <a:t>6/3/2021</a:t>
             </a:fld>
             <a:endParaRPr lang="en-US"/>
           </a:p>
@@ -12582,7 +12576,7 @@
           <a:p>
             <a:fld id="{4263717A-E3C1-4BED-ABE0-B7069385E023}" type="datetimeFigureOut">
               <a:rPr lang="en-US" smtClean="0"/>
-              <a:t>10/24/2021</a:t>
+              <a:t>6/3/2021</a:t>
             </a:fld>
             <a:endParaRPr lang="en-US"/>
           </a:p>
@@ -12760,7 +12754,7 @@
           <a:p>
             <a:fld id="{4263717A-E3C1-4BED-ABE0-B7069385E023}" type="datetimeFigureOut">
               <a:rPr lang="en-US" smtClean="0"/>
-              <a:t>10/24/2021</a:t>
+              <a:t>6/3/2021</a:t>
             </a:fld>
             <a:endParaRPr lang="en-US"/>
           </a:p>
@@ -12928,7 +12922,7 @@
           <a:p>
             <a:fld id="{4263717A-E3C1-4BED-ABE0-B7069385E023}" type="datetimeFigureOut">
               <a:rPr lang="en-US" smtClean="0"/>
-              <a:t>10/24/2021</a:t>
+              <a:t>6/3/2021</a:t>
             </a:fld>
             <a:endParaRPr lang="en-US"/>
           </a:p>
@@ -13173,7 +13167,7 @@
           <a:p>
             <a:fld id="{4263717A-E3C1-4BED-ABE0-B7069385E023}" type="datetimeFigureOut">
               <a:rPr lang="en-US" smtClean="0"/>
-              <a:t>10/24/2021</a:t>
+              <a:t>6/3/2021</a:t>
             </a:fld>
             <a:endParaRPr lang="en-US"/>
           </a:p>
@@ -13402,7 +13396,7 @@
           <a:p>
             <a:fld id="{4263717A-E3C1-4BED-ABE0-B7069385E023}" type="datetimeFigureOut">
               <a:rPr lang="en-US" smtClean="0"/>
-              <a:t>10/24/2021</a:t>
+              <a:t>6/3/2021</a:t>
             </a:fld>
             <a:endParaRPr lang="en-US"/>
           </a:p>
@@ -13766,7 +13760,7 @@
           <a:p>
             <a:fld id="{4263717A-E3C1-4BED-ABE0-B7069385E023}" type="datetimeFigureOut">
               <a:rPr lang="en-US" smtClean="0"/>
-              <a:t>10/24/2021</a:t>
+              <a:t>6/3/2021</a:t>
             </a:fld>
             <a:endParaRPr lang="en-US"/>
           </a:p>
@@ -13883,7 +13877,7 @@
           <a:p>
             <a:fld id="{4263717A-E3C1-4BED-ABE0-B7069385E023}" type="datetimeFigureOut">
               <a:rPr lang="en-US" smtClean="0"/>
-              <a:t>10/24/2021</a:t>
+              <a:t>6/3/2021</a:t>
             </a:fld>
             <a:endParaRPr lang="en-US"/>
           </a:p>
@@ -13978,7 +13972,7 @@
           <a:p>
             <a:fld id="{4263717A-E3C1-4BED-ABE0-B7069385E023}" type="datetimeFigureOut">
               <a:rPr lang="en-US" smtClean="0"/>
-              <a:t>10/24/2021</a:t>
+              <a:t>6/3/2021</a:t>
             </a:fld>
             <a:endParaRPr lang="en-US"/>
           </a:p>
@@ -14253,7 +14247,7 @@
           <a:p>
             <a:fld id="{4263717A-E3C1-4BED-ABE0-B7069385E023}" type="datetimeFigureOut">
               <a:rPr lang="en-US" smtClean="0"/>
-              <a:t>10/24/2021</a:t>
+              <a:t>6/3/2021</a:t>
             </a:fld>
             <a:endParaRPr lang="en-US"/>
           </a:p>
@@ -14505,7 +14499,7 @@
           <a:p>
             <a:fld id="{4263717A-E3C1-4BED-ABE0-B7069385E023}" type="datetimeFigureOut">
               <a:rPr lang="en-US" smtClean="0"/>
-              <a:t>10/24/2021</a:t>
+              <a:t>6/3/2021</a:t>
             </a:fld>
             <a:endParaRPr lang="en-US"/>
           </a:p>
@@ -14716,7 +14710,7 @@
           <a:p>
             <a:fld id="{4263717A-E3C1-4BED-ABE0-B7069385E023}" type="datetimeFigureOut">
               <a:rPr lang="en-US" smtClean="0"/>
-              <a:t>10/24/2021</a:t>
+              <a:t>6/3/2021</a:t>
             </a:fld>
             <a:endParaRPr lang="en-US"/>
           </a:p>
@@ -23258,7 +23252,7 @@
           <p:nvPr/>
         </p:nvPicPr>
         <p:blipFill>
-          <a:blip r:embed="rId9" cstate="print">
+          <a:blip r:embed="rId9">
             <a:extLst>
               <a:ext uri="{28A0092B-C50C-407E-A947-70E740481C1C}">
                 <a14:useLocalDpi xmlns:a14="http://schemas.microsoft.com/office/drawing/2010/main" val="0"/>

</xml_diff>